<commit_message>
Time to start getting ppts in order.
</commit_message>
<xml_diff>
--- a/PPTs/01 - Day 2.pptx
+++ b/PPTs/01 - Day 2.pptx
@@ -6,6 +6,15 @@
   </p:sldMasterIdLst>
   <p:sldIdLst>
     <p:sldId id="256" r:id="rId2"/>
+    <p:sldId id="257" r:id="rId3"/>
+    <p:sldId id="258" r:id="rId4"/>
+    <p:sldId id="259" r:id="rId5"/>
+    <p:sldId id="260" r:id="rId6"/>
+    <p:sldId id="261" r:id="rId7"/>
+    <p:sldId id="262" r:id="rId8"/>
+    <p:sldId id="263" r:id="rId9"/>
+    <p:sldId id="264" r:id="rId10"/>
+    <p:sldId id="265" r:id="rId11"/>
   </p:sldIdLst>
   <p:sldSz cx="12192000" cy="6858000"/>
   <p:notesSz cx="6858000" cy="9144000"/>
@@ -104,6 +113,11 @@
       </a:defRPr>
     </a:lvl9pPr>
   </p:defaultTextStyle>
+  <p:extLst>
+    <p:ext uri="{EFAFB233-063F-42B5-8137-9DF3F51BA10A}">
+      <p15:sldGuideLst xmlns:p15="http://schemas.microsoft.com/office/powerpoint/2012/main"/>
+    </p:ext>
+  </p:extLst>
 </p:presentation>
 </file>
 
@@ -254,7 +268,7 @@
           <a:p>
             <a:fld id="{69B9443B-7D22-3248-B63C-65A84622FF78}" type="datetimeFigureOut">
               <a:rPr lang="en-US" smtClean="0"/>
-              <a:t>10/4/24</a:t>
+              <a:t>11/1/24</a:t>
             </a:fld>
             <a:endParaRPr lang="en-US"/>
           </a:p>
@@ -452,7 +466,7 @@
           <a:p>
             <a:fld id="{69B9443B-7D22-3248-B63C-65A84622FF78}" type="datetimeFigureOut">
               <a:rPr lang="en-US" smtClean="0"/>
-              <a:t>10/4/24</a:t>
+              <a:t>11/1/24</a:t>
             </a:fld>
             <a:endParaRPr lang="en-US"/>
           </a:p>
@@ -660,7 +674,7 @@
           <a:p>
             <a:fld id="{69B9443B-7D22-3248-B63C-65A84622FF78}" type="datetimeFigureOut">
               <a:rPr lang="en-US" smtClean="0"/>
-              <a:t>10/4/24</a:t>
+              <a:t>11/1/24</a:t>
             </a:fld>
             <a:endParaRPr lang="en-US"/>
           </a:p>
@@ -858,7 +872,7 @@
           <a:p>
             <a:fld id="{69B9443B-7D22-3248-B63C-65A84622FF78}" type="datetimeFigureOut">
               <a:rPr lang="en-US" smtClean="0"/>
-              <a:t>10/4/24</a:t>
+              <a:t>11/1/24</a:t>
             </a:fld>
             <a:endParaRPr lang="en-US"/>
           </a:p>
@@ -1133,7 +1147,7 @@
           <a:p>
             <a:fld id="{69B9443B-7D22-3248-B63C-65A84622FF78}" type="datetimeFigureOut">
               <a:rPr lang="en-US" smtClean="0"/>
-              <a:t>10/4/24</a:t>
+              <a:t>11/1/24</a:t>
             </a:fld>
             <a:endParaRPr lang="en-US"/>
           </a:p>
@@ -1398,7 +1412,7 @@
           <a:p>
             <a:fld id="{69B9443B-7D22-3248-B63C-65A84622FF78}" type="datetimeFigureOut">
               <a:rPr lang="en-US" smtClean="0"/>
-              <a:t>10/4/24</a:t>
+              <a:t>11/1/24</a:t>
             </a:fld>
             <a:endParaRPr lang="en-US"/>
           </a:p>
@@ -1810,7 +1824,7 @@
           <a:p>
             <a:fld id="{69B9443B-7D22-3248-B63C-65A84622FF78}" type="datetimeFigureOut">
               <a:rPr lang="en-US" smtClean="0"/>
-              <a:t>10/4/24</a:t>
+              <a:t>11/1/24</a:t>
             </a:fld>
             <a:endParaRPr lang="en-US"/>
           </a:p>
@@ -1951,7 +1965,7 @@
           <a:p>
             <a:fld id="{69B9443B-7D22-3248-B63C-65A84622FF78}" type="datetimeFigureOut">
               <a:rPr lang="en-US" smtClean="0"/>
-              <a:t>10/4/24</a:t>
+              <a:t>11/1/24</a:t>
             </a:fld>
             <a:endParaRPr lang="en-US"/>
           </a:p>
@@ -2064,7 +2078,7 @@
           <a:p>
             <a:fld id="{69B9443B-7D22-3248-B63C-65A84622FF78}" type="datetimeFigureOut">
               <a:rPr lang="en-US" smtClean="0"/>
-              <a:t>10/4/24</a:t>
+              <a:t>11/1/24</a:t>
             </a:fld>
             <a:endParaRPr lang="en-US"/>
           </a:p>
@@ -2375,7 +2389,7 @@
           <a:p>
             <a:fld id="{69B9443B-7D22-3248-B63C-65A84622FF78}" type="datetimeFigureOut">
               <a:rPr lang="en-US" smtClean="0"/>
-              <a:t>10/4/24</a:t>
+              <a:t>11/1/24</a:t>
             </a:fld>
             <a:endParaRPr lang="en-US"/>
           </a:p>
@@ -2663,7 +2677,7 @@
           <a:p>
             <a:fld id="{69B9443B-7D22-3248-B63C-65A84622FF78}" type="datetimeFigureOut">
               <a:rPr lang="en-US" smtClean="0"/>
-              <a:t>10/4/24</a:t>
+              <a:t>11/1/24</a:t>
             </a:fld>
             <a:endParaRPr lang="en-US"/>
           </a:p>
@@ -2904,7 +2918,7 @@
           <a:p>
             <a:fld id="{69B9443B-7D22-3248-B63C-65A84622FF78}" type="datetimeFigureOut">
               <a:rPr lang="en-US" smtClean="0"/>
-              <a:t>10/4/24</a:t>
+              <a:t>11/1/24</a:t>
             </a:fld>
             <a:endParaRPr lang="en-US"/>
           </a:p>
@@ -3347,6 +3361,40 @@
         </p:nvSpPr>
         <p:spPr/>
         <p:txBody>
+          <a:bodyPr>
+            <a:normAutofit fontScale="90000"/>
+          </a:bodyPr>
+          <a:lstStyle/>
+          <a:p>
+            <a:r>
+              <a:rPr lang="en-US" sz="8800" dirty="0">
+                <a:solidFill>
+                  <a:schemeClr val="bg1"/>
+                </a:solidFill>
+              </a:rPr>
+              <a:t>Vintage Game Design</a:t>
+            </a:r>
+          </a:p>
+        </p:txBody>
+      </p:sp>
+      <p:sp>
+        <p:nvSpPr>
+          <p:cNvPr id="3" name="Subtitle 2">
+            <a:extLst>
+              <a:ext uri="{FF2B5EF4-FFF2-40B4-BE49-F238E27FC236}">
+                <a16:creationId xmlns:a16="http://schemas.microsoft.com/office/drawing/2014/main" id="{D7E79357-DD09-8B6A-7514-C550F76F91F3}"/>
+              </a:ext>
+            </a:extLst>
+          </p:cNvPr>
+          <p:cNvSpPr>
+            <a:spLocks noGrp="1"/>
+          </p:cNvSpPr>
+          <p:nvPr>
+            <p:ph type="subTitle" idx="1"/>
+          </p:nvPr>
+        </p:nvSpPr>
+        <p:spPr/>
+        <p:txBody>
           <a:bodyPr/>
           <a:lstStyle/>
           <a:p>
@@ -3356,53 +3404,24 @@
                   <a:schemeClr val="bg1"/>
                 </a:solidFill>
               </a:rPr>
-              <a:t>Vintage Game Design</a:t>
-            </a:r>
-          </a:p>
-        </p:txBody>
-      </p:sp>
-      <p:sp>
-        <p:nvSpPr>
-          <p:cNvPr id="3" name="Subtitle 2">
-            <a:extLst>
-              <a:ext uri="{FF2B5EF4-FFF2-40B4-BE49-F238E27FC236}">
-                <a16:creationId xmlns:a16="http://schemas.microsoft.com/office/drawing/2014/main" id="{D7E79357-DD09-8B6A-7514-C550F76F91F3}"/>
-              </a:ext>
-            </a:extLst>
-          </p:cNvPr>
-          <p:cNvSpPr>
-            <a:spLocks noGrp="1"/>
-          </p:cNvSpPr>
-          <p:nvPr>
-            <p:ph type="subTitle" idx="1"/>
-          </p:nvPr>
-        </p:nvSpPr>
-        <p:spPr/>
-        <p:txBody>
-          <a:bodyPr/>
-          <a:lstStyle/>
-          <a:p>
+              <a:t>Day </a:t>
+            </a:r>
+            <a:r>
+              <a:rPr lang="en-US">
+                <a:solidFill>
+                  <a:schemeClr val="bg1"/>
+                </a:solidFill>
+              </a:rPr>
+              <a:t>2 –What </a:t>
+            </a:r>
             <a:r>
               <a:rPr lang="en-US" dirty="0">
                 <a:solidFill>
                   <a:schemeClr val="bg1"/>
                 </a:solidFill>
               </a:rPr>
-              <a:t>Day 2 – Technology? More Like…uh, </a:t>
-            </a:r>
-            <a:r>
-              <a:rPr lang="en-US" dirty="0" err="1">
-                <a:solidFill>
-                  <a:schemeClr val="bg1"/>
-                </a:solidFill>
-              </a:rPr>
-              <a:t>Flinstology</a:t>
-            </a:r>
-            <a:endParaRPr lang="en-US" dirty="0">
-              <a:solidFill>
-                <a:schemeClr val="bg1"/>
-              </a:solidFill>
-            </a:endParaRPr>
+              <a:t>You’ll Be Working With</a:t>
+            </a:r>
           </a:p>
         </p:txBody>
       </p:sp>
@@ -3410,6 +3429,771 @@
     <p:extLst>
       <p:ext uri="{BB962C8B-B14F-4D97-AF65-F5344CB8AC3E}">
         <p14:creationId xmlns:p14="http://schemas.microsoft.com/office/powerpoint/2010/main" val="4239337773"/>
+      </p:ext>
+    </p:extLst>
+  </p:cSld>
+  <p:clrMapOvr>
+    <a:masterClrMapping/>
+  </p:clrMapOvr>
+</p:sld>
+</file>
+
+<file path=ppt/slides/slide10.xml><?xml version="1.0" encoding="utf-8"?>
+<p:sld xmlns:a="http://schemas.openxmlformats.org/drawingml/2006/main" xmlns:r="http://schemas.openxmlformats.org/officeDocument/2006/relationships" xmlns:p="http://schemas.openxmlformats.org/presentationml/2006/main">
+  <p:cSld>
+    <p:bg>
+      <p:bgPr>
+        <a:solidFill>
+          <a:schemeClr val="tx1"/>
+        </a:solidFill>
+        <a:effectLst/>
+      </p:bgPr>
+    </p:bg>
+    <p:spTree>
+      <p:nvGrpSpPr>
+        <p:cNvPr id="1" name="">
+          <a:extLst>
+            <a:ext uri="{FF2B5EF4-FFF2-40B4-BE49-F238E27FC236}">
+              <a16:creationId xmlns:a16="http://schemas.microsoft.com/office/drawing/2014/main" id="{ECAE381B-643C-67EF-41F5-BCAC41A66E32}"/>
+            </a:ext>
+          </a:extLst>
+        </p:cNvPr>
+        <p:cNvGrpSpPr/>
+        <p:nvPr/>
+      </p:nvGrpSpPr>
+      <p:grpSpPr>
+        <a:xfrm>
+          <a:off x="0" y="0"/>
+          <a:ext cx="0" cy="0"/>
+          <a:chOff x="0" y="0"/>
+          <a:chExt cx="0" cy="0"/>
+        </a:xfrm>
+      </p:grpSpPr>
+      <p:sp>
+        <p:nvSpPr>
+          <p:cNvPr id="2" name="Title 1">
+            <a:extLst>
+              <a:ext uri="{FF2B5EF4-FFF2-40B4-BE49-F238E27FC236}">
+                <a16:creationId xmlns:a16="http://schemas.microsoft.com/office/drawing/2014/main" id="{6A959E99-E096-FD9E-F7B7-503F8D79F5B1}"/>
+              </a:ext>
+            </a:extLst>
+          </p:cNvPr>
+          <p:cNvSpPr>
+            <a:spLocks noGrp="1"/>
+          </p:cNvSpPr>
+          <p:nvPr>
+            <p:ph type="ctrTitle"/>
+          </p:nvPr>
+        </p:nvSpPr>
+        <p:spPr>
+          <a:xfrm>
+            <a:off x="2778086" y="2718412"/>
+            <a:ext cx="6635827" cy="1421176"/>
+          </a:xfrm>
+        </p:spPr>
+        <p:txBody>
+          <a:bodyPr>
+            <a:normAutofit/>
+          </a:bodyPr>
+          <a:lstStyle/>
+          <a:p>
+            <a:r>
+              <a:rPr lang="en-US" sz="8800" dirty="0">
+                <a:solidFill>
+                  <a:schemeClr val="bg1"/>
+                </a:solidFill>
+                <a:latin typeface="Arial" panose="020B0604020202020204" pitchFamily="34" charset="0"/>
+                <a:cs typeface="Arial" panose="020B0604020202020204" pitchFamily="34" charset="0"/>
+              </a:rPr>
+              <a:t>tech specs</a:t>
+            </a:r>
+          </a:p>
+        </p:txBody>
+      </p:sp>
+    </p:spTree>
+    <p:extLst>
+      <p:ext uri="{BB962C8B-B14F-4D97-AF65-F5344CB8AC3E}">
+        <p14:creationId xmlns:p14="http://schemas.microsoft.com/office/powerpoint/2010/main" val="3693923400"/>
+      </p:ext>
+    </p:extLst>
+  </p:cSld>
+  <p:clrMapOvr>
+    <a:masterClrMapping/>
+  </p:clrMapOvr>
+</p:sld>
+</file>
+
+<file path=ppt/slides/slide2.xml><?xml version="1.0" encoding="utf-8"?>
+<p:sld xmlns:a="http://schemas.openxmlformats.org/drawingml/2006/main" xmlns:r="http://schemas.openxmlformats.org/officeDocument/2006/relationships" xmlns:p="http://schemas.openxmlformats.org/presentationml/2006/main">
+  <p:cSld>
+    <p:bg>
+      <p:bgPr>
+        <a:solidFill>
+          <a:schemeClr val="tx1"/>
+        </a:solidFill>
+        <a:effectLst/>
+      </p:bgPr>
+    </p:bg>
+    <p:spTree>
+      <p:nvGrpSpPr>
+        <p:cNvPr id="1" name="">
+          <a:extLst>
+            <a:ext uri="{FF2B5EF4-FFF2-40B4-BE49-F238E27FC236}">
+              <a16:creationId xmlns:a16="http://schemas.microsoft.com/office/drawing/2014/main" id="{991738A6-1094-C850-5880-B74A7BFA68B0}"/>
+            </a:ext>
+          </a:extLst>
+        </p:cNvPr>
+        <p:cNvGrpSpPr/>
+        <p:nvPr/>
+      </p:nvGrpSpPr>
+      <p:grpSpPr>
+        <a:xfrm>
+          <a:off x="0" y="0"/>
+          <a:ext cx="0" cy="0"/>
+          <a:chOff x="0" y="0"/>
+          <a:chExt cx="0" cy="0"/>
+        </a:xfrm>
+      </p:grpSpPr>
+      <p:sp>
+        <p:nvSpPr>
+          <p:cNvPr id="2" name="Title 1">
+            <a:extLst>
+              <a:ext uri="{FF2B5EF4-FFF2-40B4-BE49-F238E27FC236}">
+                <a16:creationId xmlns:a16="http://schemas.microsoft.com/office/drawing/2014/main" id="{9540FE9C-EE38-C344-1CB7-788AC8B84CD1}"/>
+              </a:ext>
+            </a:extLst>
+          </p:cNvPr>
+          <p:cNvSpPr>
+            <a:spLocks noGrp="1"/>
+          </p:cNvSpPr>
+          <p:nvPr>
+            <p:ph type="ctrTitle"/>
+          </p:nvPr>
+        </p:nvSpPr>
+        <p:spPr>
+          <a:xfrm>
+            <a:off x="2778086" y="2718412"/>
+            <a:ext cx="6635827" cy="1421176"/>
+          </a:xfrm>
+        </p:spPr>
+        <p:txBody>
+          <a:bodyPr>
+            <a:normAutofit/>
+          </a:bodyPr>
+          <a:lstStyle/>
+          <a:p>
+            <a:r>
+              <a:rPr lang="en-US" sz="8800" dirty="0">
+                <a:solidFill>
+                  <a:schemeClr val="bg1"/>
+                </a:solidFill>
+                <a:latin typeface="Arial" panose="020B0604020202020204" pitchFamily="34" charset="0"/>
+                <a:cs typeface="Arial" panose="020B0604020202020204" pitchFamily="34" charset="0"/>
+              </a:rPr>
+              <a:t>tech specs</a:t>
+            </a:r>
+          </a:p>
+        </p:txBody>
+      </p:sp>
+    </p:spTree>
+    <p:extLst>
+      <p:ext uri="{BB962C8B-B14F-4D97-AF65-F5344CB8AC3E}">
+        <p14:creationId xmlns:p14="http://schemas.microsoft.com/office/powerpoint/2010/main" val="1281997652"/>
+      </p:ext>
+    </p:extLst>
+  </p:cSld>
+  <p:clrMapOvr>
+    <a:masterClrMapping/>
+  </p:clrMapOvr>
+</p:sld>
+</file>
+
+<file path=ppt/slides/slide3.xml><?xml version="1.0" encoding="utf-8"?>
+<p:sld xmlns:a="http://schemas.openxmlformats.org/drawingml/2006/main" xmlns:r="http://schemas.openxmlformats.org/officeDocument/2006/relationships" xmlns:p="http://schemas.openxmlformats.org/presentationml/2006/main">
+  <p:cSld>
+    <p:bg>
+      <p:bgPr>
+        <a:solidFill>
+          <a:schemeClr val="tx1"/>
+        </a:solidFill>
+        <a:effectLst/>
+      </p:bgPr>
+    </p:bg>
+    <p:spTree>
+      <p:nvGrpSpPr>
+        <p:cNvPr id="1" name="">
+          <a:extLst>
+            <a:ext uri="{FF2B5EF4-FFF2-40B4-BE49-F238E27FC236}">
+              <a16:creationId xmlns:a16="http://schemas.microsoft.com/office/drawing/2014/main" id="{DCB73032-B54C-BC26-8FA8-9041AB2278EC}"/>
+            </a:ext>
+          </a:extLst>
+        </p:cNvPr>
+        <p:cNvGrpSpPr/>
+        <p:nvPr/>
+      </p:nvGrpSpPr>
+      <p:grpSpPr>
+        <a:xfrm>
+          <a:off x="0" y="0"/>
+          <a:ext cx="0" cy="0"/>
+          <a:chOff x="0" y="0"/>
+          <a:chExt cx="0" cy="0"/>
+        </a:xfrm>
+      </p:grpSpPr>
+      <p:sp>
+        <p:nvSpPr>
+          <p:cNvPr id="2" name="Title 1">
+            <a:extLst>
+              <a:ext uri="{FF2B5EF4-FFF2-40B4-BE49-F238E27FC236}">
+                <a16:creationId xmlns:a16="http://schemas.microsoft.com/office/drawing/2014/main" id="{72958AF1-3D7D-519E-B6CF-ACDDA006AEEA}"/>
+              </a:ext>
+            </a:extLst>
+          </p:cNvPr>
+          <p:cNvSpPr>
+            <a:spLocks noGrp="1"/>
+          </p:cNvSpPr>
+          <p:nvPr>
+            <p:ph type="ctrTitle"/>
+          </p:nvPr>
+        </p:nvSpPr>
+        <p:spPr>
+          <a:xfrm>
+            <a:off x="2778086" y="2718412"/>
+            <a:ext cx="6635827" cy="1421176"/>
+          </a:xfrm>
+        </p:spPr>
+        <p:txBody>
+          <a:bodyPr>
+            <a:normAutofit/>
+          </a:bodyPr>
+          <a:lstStyle/>
+          <a:p>
+            <a:r>
+              <a:rPr lang="en-US" sz="8800" dirty="0">
+                <a:solidFill>
+                  <a:schemeClr val="bg1"/>
+                </a:solidFill>
+                <a:latin typeface="Arial" panose="020B0604020202020204" pitchFamily="34" charset="0"/>
+                <a:cs typeface="Arial" panose="020B0604020202020204" pitchFamily="34" charset="0"/>
+              </a:rPr>
+              <a:t>tech specs</a:t>
+            </a:r>
+          </a:p>
+        </p:txBody>
+      </p:sp>
+    </p:spTree>
+    <p:extLst>
+      <p:ext uri="{BB962C8B-B14F-4D97-AF65-F5344CB8AC3E}">
+        <p14:creationId xmlns:p14="http://schemas.microsoft.com/office/powerpoint/2010/main" val="3180588261"/>
+      </p:ext>
+    </p:extLst>
+  </p:cSld>
+  <p:clrMapOvr>
+    <a:masterClrMapping/>
+  </p:clrMapOvr>
+</p:sld>
+</file>
+
+<file path=ppt/slides/slide4.xml><?xml version="1.0" encoding="utf-8"?>
+<p:sld xmlns:a="http://schemas.openxmlformats.org/drawingml/2006/main" xmlns:r="http://schemas.openxmlformats.org/officeDocument/2006/relationships" xmlns:p="http://schemas.openxmlformats.org/presentationml/2006/main">
+  <p:cSld>
+    <p:bg>
+      <p:bgPr>
+        <a:solidFill>
+          <a:schemeClr val="tx1"/>
+        </a:solidFill>
+        <a:effectLst/>
+      </p:bgPr>
+    </p:bg>
+    <p:spTree>
+      <p:nvGrpSpPr>
+        <p:cNvPr id="1" name="">
+          <a:extLst>
+            <a:ext uri="{FF2B5EF4-FFF2-40B4-BE49-F238E27FC236}">
+              <a16:creationId xmlns:a16="http://schemas.microsoft.com/office/drawing/2014/main" id="{0589DDF4-F7C8-8C01-380B-2D8FB5F127CA}"/>
+            </a:ext>
+          </a:extLst>
+        </p:cNvPr>
+        <p:cNvGrpSpPr/>
+        <p:nvPr/>
+      </p:nvGrpSpPr>
+      <p:grpSpPr>
+        <a:xfrm>
+          <a:off x="0" y="0"/>
+          <a:ext cx="0" cy="0"/>
+          <a:chOff x="0" y="0"/>
+          <a:chExt cx="0" cy="0"/>
+        </a:xfrm>
+      </p:grpSpPr>
+      <p:sp>
+        <p:nvSpPr>
+          <p:cNvPr id="2" name="Title 1">
+            <a:extLst>
+              <a:ext uri="{FF2B5EF4-FFF2-40B4-BE49-F238E27FC236}">
+                <a16:creationId xmlns:a16="http://schemas.microsoft.com/office/drawing/2014/main" id="{A582C1F4-5D53-44D9-EC5C-85BB1FF210A5}"/>
+              </a:ext>
+            </a:extLst>
+          </p:cNvPr>
+          <p:cNvSpPr>
+            <a:spLocks noGrp="1"/>
+          </p:cNvSpPr>
+          <p:nvPr>
+            <p:ph type="ctrTitle"/>
+          </p:nvPr>
+        </p:nvSpPr>
+        <p:spPr>
+          <a:xfrm>
+            <a:off x="2778086" y="2718412"/>
+            <a:ext cx="6635827" cy="1421176"/>
+          </a:xfrm>
+        </p:spPr>
+        <p:txBody>
+          <a:bodyPr>
+            <a:normAutofit/>
+          </a:bodyPr>
+          <a:lstStyle/>
+          <a:p>
+            <a:r>
+              <a:rPr lang="en-US" sz="8800" dirty="0">
+                <a:solidFill>
+                  <a:schemeClr val="bg1"/>
+                </a:solidFill>
+                <a:latin typeface="Arial" panose="020B0604020202020204" pitchFamily="34" charset="0"/>
+                <a:cs typeface="Arial" panose="020B0604020202020204" pitchFamily="34" charset="0"/>
+              </a:rPr>
+              <a:t>tech specs</a:t>
+            </a:r>
+          </a:p>
+        </p:txBody>
+      </p:sp>
+    </p:spTree>
+    <p:extLst>
+      <p:ext uri="{BB962C8B-B14F-4D97-AF65-F5344CB8AC3E}">
+        <p14:creationId xmlns:p14="http://schemas.microsoft.com/office/powerpoint/2010/main" val="564004569"/>
+      </p:ext>
+    </p:extLst>
+  </p:cSld>
+  <p:clrMapOvr>
+    <a:masterClrMapping/>
+  </p:clrMapOvr>
+</p:sld>
+</file>
+
+<file path=ppt/slides/slide5.xml><?xml version="1.0" encoding="utf-8"?>
+<p:sld xmlns:a="http://schemas.openxmlformats.org/drawingml/2006/main" xmlns:r="http://schemas.openxmlformats.org/officeDocument/2006/relationships" xmlns:p="http://schemas.openxmlformats.org/presentationml/2006/main">
+  <p:cSld>
+    <p:bg>
+      <p:bgPr>
+        <a:solidFill>
+          <a:schemeClr val="tx1"/>
+        </a:solidFill>
+        <a:effectLst/>
+      </p:bgPr>
+    </p:bg>
+    <p:spTree>
+      <p:nvGrpSpPr>
+        <p:cNvPr id="1" name="">
+          <a:extLst>
+            <a:ext uri="{FF2B5EF4-FFF2-40B4-BE49-F238E27FC236}">
+              <a16:creationId xmlns:a16="http://schemas.microsoft.com/office/drawing/2014/main" id="{CD4CB701-F6F5-9FC6-F34F-2255A5B5E780}"/>
+            </a:ext>
+          </a:extLst>
+        </p:cNvPr>
+        <p:cNvGrpSpPr/>
+        <p:nvPr/>
+      </p:nvGrpSpPr>
+      <p:grpSpPr>
+        <a:xfrm>
+          <a:off x="0" y="0"/>
+          <a:ext cx="0" cy="0"/>
+          <a:chOff x="0" y="0"/>
+          <a:chExt cx="0" cy="0"/>
+        </a:xfrm>
+      </p:grpSpPr>
+      <p:sp>
+        <p:nvSpPr>
+          <p:cNvPr id="2" name="Title 1">
+            <a:extLst>
+              <a:ext uri="{FF2B5EF4-FFF2-40B4-BE49-F238E27FC236}">
+                <a16:creationId xmlns:a16="http://schemas.microsoft.com/office/drawing/2014/main" id="{92C30A7F-AD4F-A2BD-B231-90D9D8025196}"/>
+              </a:ext>
+            </a:extLst>
+          </p:cNvPr>
+          <p:cNvSpPr>
+            <a:spLocks noGrp="1"/>
+          </p:cNvSpPr>
+          <p:nvPr>
+            <p:ph type="ctrTitle"/>
+          </p:nvPr>
+        </p:nvSpPr>
+        <p:spPr>
+          <a:xfrm>
+            <a:off x="2778086" y="2718412"/>
+            <a:ext cx="6635827" cy="1421176"/>
+          </a:xfrm>
+        </p:spPr>
+        <p:txBody>
+          <a:bodyPr>
+            <a:normAutofit/>
+          </a:bodyPr>
+          <a:lstStyle/>
+          <a:p>
+            <a:r>
+              <a:rPr lang="en-US" sz="8800" dirty="0">
+                <a:solidFill>
+                  <a:schemeClr val="bg1"/>
+                </a:solidFill>
+                <a:latin typeface="Arial" panose="020B0604020202020204" pitchFamily="34" charset="0"/>
+                <a:cs typeface="Arial" panose="020B0604020202020204" pitchFamily="34" charset="0"/>
+              </a:rPr>
+              <a:t>tech specs</a:t>
+            </a:r>
+          </a:p>
+        </p:txBody>
+      </p:sp>
+    </p:spTree>
+    <p:extLst>
+      <p:ext uri="{BB962C8B-B14F-4D97-AF65-F5344CB8AC3E}">
+        <p14:creationId xmlns:p14="http://schemas.microsoft.com/office/powerpoint/2010/main" val="2754174502"/>
+      </p:ext>
+    </p:extLst>
+  </p:cSld>
+  <p:clrMapOvr>
+    <a:masterClrMapping/>
+  </p:clrMapOvr>
+</p:sld>
+</file>
+
+<file path=ppt/slides/slide6.xml><?xml version="1.0" encoding="utf-8"?>
+<p:sld xmlns:a="http://schemas.openxmlformats.org/drawingml/2006/main" xmlns:r="http://schemas.openxmlformats.org/officeDocument/2006/relationships" xmlns:p="http://schemas.openxmlformats.org/presentationml/2006/main">
+  <p:cSld>
+    <p:bg>
+      <p:bgPr>
+        <a:solidFill>
+          <a:schemeClr val="tx1"/>
+        </a:solidFill>
+        <a:effectLst/>
+      </p:bgPr>
+    </p:bg>
+    <p:spTree>
+      <p:nvGrpSpPr>
+        <p:cNvPr id="1" name="">
+          <a:extLst>
+            <a:ext uri="{FF2B5EF4-FFF2-40B4-BE49-F238E27FC236}">
+              <a16:creationId xmlns:a16="http://schemas.microsoft.com/office/drawing/2014/main" id="{8330AF8C-2C58-65F8-4553-24322D905DD5}"/>
+            </a:ext>
+          </a:extLst>
+        </p:cNvPr>
+        <p:cNvGrpSpPr/>
+        <p:nvPr/>
+      </p:nvGrpSpPr>
+      <p:grpSpPr>
+        <a:xfrm>
+          <a:off x="0" y="0"/>
+          <a:ext cx="0" cy="0"/>
+          <a:chOff x="0" y="0"/>
+          <a:chExt cx="0" cy="0"/>
+        </a:xfrm>
+      </p:grpSpPr>
+      <p:sp>
+        <p:nvSpPr>
+          <p:cNvPr id="2" name="Title 1">
+            <a:extLst>
+              <a:ext uri="{FF2B5EF4-FFF2-40B4-BE49-F238E27FC236}">
+                <a16:creationId xmlns:a16="http://schemas.microsoft.com/office/drawing/2014/main" id="{F84BE979-D699-EEB3-CD71-EF732B8A0476}"/>
+              </a:ext>
+            </a:extLst>
+          </p:cNvPr>
+          <p:cNvSpPr>
+            <a:spLocks noGrp="1"/>
+          </p:cNvSpPr>
+          <p:nvPr>
+            <p:ph type="ctrTitle"/>
+          </p:nvPr>
+        </p:nvSpPr>
+        <p:spPr>
+          <a:xfrm>
+            <a:off x="2778086" y="2718412"/>
+            <a:ext cx="6635827" cy="1421176"/>
+          </a:xfrm>
+        </p:spPr>
+        <p:txBody>
+          <a:bodyPr>
+            <a:normAutofit/>
+          </a:bodyPr>
+          <a:lstStyle/>
+          <a:p>
+            <a:r>
+              <a:rPr lang="en-US" sz="8800" dirty="0">
+                <a:solidFill>
+                  <a:schemeClr val="bg1"/>
+                </a:solidFill>
+                <a:latin typeface="Arial" panose="020B0604020202020204" pitchFamily="34" charset="0"/>
+                <a:cs typeface="Arial" panose="020B0604020202020204" pitchFamily="34" charset="0"/>
+              </a:rPr>
+              <a:t>tech specs</a:t>
+            </a:r>
+          </a:p>
+        </p:txBody>
+      </p:sp>
+    </p:spTree>
+    <p:extLst>
+      <p:ext uri="{BB962C8B-B14F-4D97-AF65-F5344CB8AC3E}">
+        <p14:creationId xmlns:p14="http://schemas.microsoft.com/office/powerpoint/2010/main" val="2327697149"/>
+      </p:ext>
+    </p:extLst>
+  </p:cSld>
+  <p:clrMapOvr>
+    <a:masterClrMapping/>
+  </p:clrMapOvr>
+</p:sld>
+</file>
+
+<file path=ppt/slides/slide7.xml><?xml version="1.0" encoding="utf-8"?>
+<p:sld xmlns:a="http://schemas.openxmlformats.org/drawingml/2006/main" xmlns:r="http://schemas.openxmlformats.org/officeDocument/2006/relationships" xmlns:p="http://schemas.openxmlformats.org/presentationml/2006/main">
+  <p:cSld>
+    <p:bg>
+      <p:bgPr>
+        <a:solidFill>
+          <a:schemeClr val="tx1"/>
+        </a:solidFill>
+        <a:effectLst/>
+      </p:bgPr>
+    </p:bg>
+    <p:spTree>
+      <p:nvGrpSpPr>
+        <p:cNvPr id="1" name="">
+          <a:extLst>
+            <a:ext uri="{FF2B5EF4-FFF2-40B4-BE49-F238E27FC236}">
+              <a16:creationId xmlns:a16="http://schemas.microsoft.com/office/drawing/2014/main" id="{AC505EDC-93A9-A8F2-C2D0-C6D96221ABCB}"/>
+            </a:ext>
+          </a:extLst>
+        </p:cNvPr>
+        <p:cNvGrpSpPr/>
+        <p:nvPr/>
+      </p:nvGrpSpPr>
+      <p:grpSpPr>
+        <a:xfrm>
+          <a:off x="0" y="0"/>
+          <a:ext cx="0" cy="0"/>
+          <a:chOff x="0" y="0"/>
+          <a:chExt cx="0" cy="0"/>
+        </a:xfrm>
+      </p:grpSpPr>
+      <p:sp>
+        <p:nvSpPr>
+          <p:cNvPr id="2" name="Title 1">
+            <a:extLst>
+              <a:ext uri="{FF2B5EF4-FFF2-40B4-BE49-F238E27FC236}">
+                <a16:creationId xmlns:a16="http://schemas.microsoft.com/office/drawing/2014/main" id="{BE0CFA68-48ED-58AA-0143-1C120357E148}"/>
+              </a:ext>
+            </a:extLst>
+          </p:cNvPr>
+          <p:cNvSpPr>
+            <a:spLocks noGrp="1"/>
+          </p:cNvSpPr>
+          <p:nvPr>
+            <p:ph type="ctrTitle"/>
+          </p:nvPr>
+        </p:nvSpPr>
+        <p:spPr>
+          <a:xfrm>
+            <a:off x="2778086" y="2718412"/>
+            <a:ext cx="6635827" cy="1421176"/>
+          </a:xfrm>
+        </p:spPr>
+        <p:txBody>
+          <a:bodyPr>
+            <a:normAutofit/>
+          </a:bodyPr>
+          <a:lstStyle/>
+          <a:p>
+            <a:r>
+              <a:rPr lang="en-US" sz="8800" dirty="0">
+                <a:solidFill>
+                  <a:schemeClr val="bg1"/>
+                </a:solidFill>
+                <a:latin typeface="Arial" panose="020B0604020202020204" pitchFamily="34" charset="0"/>
+                <a:cs typeface="Arial" panose="020B0604020202020204" pitchFamily="34" charset="0"/>
+              </a:rPr>
+              <a:t>tech specs</a:t>
+            </a:r>
+          </a:p>
+        </p:txBody>
+      </p:sp>
+    </p:spTree>
+    <p:extLst>
+      <p:ext uri="{BB962C8B-B14F-4D97-AF65-F5344CB8AC3E}">
+        <p14:creationId xmlns:p14="http://schemas.microsoft.com/office/powerpoint/2010/main" val="1227462295"/>
+      </p:ext>
+    </p:extLst>
+  </p:cSld>
+  <p:clrMapOvr>
+    <a:masterClrMapping/>
+  </p:clrMapOvr>
+</p:sld>
+</file>
+
+<file path=ppt/slides/slide8.xml><?xml version="1.0" encoding="utf-8"?>
+<p:sld xmlns:a="http://schemas.openxmlformats.org/drawingml/2006/main" xmlns:r="http://schemas.openxmlformats.org/officeDocument/2006/relationships" xmlns:p="http://schemas.openxmlformats.org/presentationml/2006/main">
+  <p:cSld>
+    <p:bg>
+      <p:bgPr>
+        <a:solidFill>
+          <a:schemeClr val="tx1"/>
+        </a:solidFill>
+        <a:effectLst/>
+      </p:bgPr>
+    </p:bg>
+    <p:spTree>
+      <p:nvGrpSpPr>
+        <p:cNvPr id="1" name="">
+          <a:extLst>
+            <a:ext uri="{FF2B5EF4-FFF2-40B4-BE49-F238E27FC236}">
+              <a16:creationId xmlns:a16="http://schemas.microsoft.com/office/drawing/2014/main" id="{255D1445-7442-F45E-C62D-314A72AC78D3}"/>
+            </a:ext>
+          </a:extLst>
+        </p:cNvPr>
+        <p:cNvGrpSpPr/>
+        <p:nvPr/>
+      </p:nvGrpSpPr>
+      <p:grpSpPr>
+        <a:xfrm>
+          <a:off x="0" y="0"/>
+          <a:ext cx="0" cy="0"/>
+          <a:chOff x="0" y="0"/>
+          <a:chExt cx="0" cy="0"/>
+        </a:xfrm>
+      </p:grpSpPr>
+      <p:sp>
+        <p:nvSpPr>
+          <p:cNvPr id="2" name="Title 1">
+            <a:extLst>
+              <a:ext uri="{FF2B5EF4-FFF2-40B4-BE49-F238E27FC236}">
+                <a16:creationId xmlns:a16="http://schemas.microsoft.com/office/drawing/2014/main" id="{967548FB-5CD4-F875-9F4E-7489C597E772}"/>
+              </a:ext>
+            </a:extLst>
+          </p:cNvPr>
+          <p:cNvSpPr>
+            <a:spLocks noGrp="1"/>
+          </p:cNvSpPr>
+          <p:nvPr>
+            <p:ph type="ctrTitle"/>
+          </p:nvPr>
+        </p:nvSpPr>
+        <p:spPr>
+          <a:xfrm>
+            <a:off x="2778086" y="2718412"/>
+            <a:ext cx="6635827" cy="1421176"/>
+          </a:xfrm>
+        </p:spPr>
+        <p:txBody>
+          <a:bodyPr>
+            <a:normAutofit/>
+          </a:bodyPr>
+          <a:lstStyle/>
+          <a:p>
+            <a:r>
+              <a:rPr lang="en-US" sz="8800" dirty="0">
+                <a:solidFill>
+                  <a:schemeClr val="bg1"/>
+                </a:solidFill>
+                <a:latin typeface="Arial" panose="020B0604020202020204" pitchFamily="34" charset="0"/>
+                <a:cs typeface="Arial" panose="020B0604020202020204" pitchFamily="34" charset="0"/>
+              </a:rPr>
+              <a:t>tech specs</a:t>
+            </a:r>
+          </a:p>
+        </p:txBody>
+      </p:sp>
+    </p:spTree>
+    <p:extLst>
+      <p:ext uri="{BB962C8B-B14F-4D97-AF65-F5344CB8AC3E}">
+        <p14:creationId xmlns:p14="http://schemas.microsoft.com/office/powerpoint/2010/main" val="3082168382"/>
+      </p:ext>
+    </p:extLst>
+  </p:cSld>
+  <p:clrMapOvr>
+    <a:masterClrMapping/>
+  </p:clrMapOvr>
+</p:sld>
+</file>
+
+<file path=ppt/slides/slide9.xml><?xml version="1.0" encoding="utf-8"?>
+<p:sld xmlns:a="http://schemas.openxmlformats.org/drawingml/2006/main" xmlns:r="http://schemas.openxmlformats.org/officeDocument/2006/relationships" xmlns:p="http://schemas.openxmlformats.org/presentationml/2006/main">
+  <p:cSld>
+    <p:bg>
+      <p:bgPr>
+        <a:solidFill>
+          <a:schemeClr val="tx1"/>
+        </a:solidFill>
+        <a:effectLst/>
+      </p:bgPr>
+    </p:bg>
+    <p:spTree>
+      <p:nvGrpSpPr>
+        <p:cNvPr id="1" name="">
+          <a:extLst>
+            <a:ext uri="{FF2B5EF4-FFF2-40B4-BE49-F238E27FC236}">
+              <a16:creationId xmlns:a16="http://schemas.microsoft.com/office/drawing/2014/main" id="{896F768E-F972-4921-434D-025E5C648F86}"/>
+            </a:ext>
+          </a:extLst>
+        </p:cNvPr>
+        <p:cNvGrpSpPr/>
+        <p:nvPr/>
+      </p:nvGrpSpPr>
+      <p:grpSpPr>
+        <a:xfrm>
+          <a:off x="0" y="0"/>
+          <a:ext cx="0" cy="0"/>
+          <a:chOff x="0" y="0"/>
+          <a:chExt cx="0" cy="0"/>
+        </a:xfrm>
+      </p:grpSpPr>
+      <p:sp>
+        <p:nvSpPr>
+          <p:cNvPr id="2" name="Title 1">
+            <a:extLst>
+              <a:ext uri="{FF2B5EF4-FFF2-40B4-BE49-F238E27FC236}">
+                <a16:creationId xmlns:a16="http://schemas.microsoft.com/office/drawing/2014/main" id="{10DDC105-5B38-677C-C140-90B29073049E}"/>
+              </a:ext>
+            </a:extLst>
+          </p:cNvPr>
+          <p:cNvSpPr>
+            <a:spLocks noGrp="1"/>
+          </p:cNvSpPr>
+          <p:nvPr>
+            <p:ph type="ctrTitle"/>
+          </p:nvPr>
+        </p:nvSpPr>
+        <p:spPr>
+          <a:xfrm>
+            <a:off x="2778086" y="2718412"/>
+            <a:ext cx="6635827" cy="1421176"/>
+          </a:xfrm>
+        </p:spPr>
+        <p:txBody>
+          <a:bodyPr>
+            <a:normAutofit/>
+          </a:bodyPr>
+          <a:lstStyle/>
+          <a:p>
+            <a:r>
+              <a:rPr lang="en-US" sz="8800" dirty="0">
+                <a:solidFill>
+                  <a:schemeClr val="bg1"/>
+                </a:solidFill>
+                <a:latin typeface="Arial" panose="020B0604020202020204" pitchFamily="34" charset="0"/>
+                <a:cs typeface="Arial" panose="020B0604020202020204" pitchFamily="34" charset="0"/>
+              </a:rPr>
+              <a:t>tech specs</a:t>
+            </a:r>
+          </a:p>
+        </p:txBody>
+      </p:sp>
+    </p:spTree>
+    <p:extLst>
+      <p:ext uri="{BB962C8B-B14F-4D97-AF65-F5344CB8AC3E}">
+        <p14:creationId xmlns:p14="http://schemas.microsoft.com/office/powerpoint/2010/main" val="2500796418"/>
       </p:ext>
     </p:extLst>
   </p:cSld>

</xml_diff>

<commit_message>
Let's update a bit more. Getting the tech specs in order.
Soon getting to actual instruction but want to hit the right notes to make it a bit easier to deal with.
</commit_message>
<xml_diff>
--- a/PPTs/01 - Day 2.pptx
+++ b/PPTs/01 - Day 2.pptx
@@ -268,7 +268,7 @@
           <a:p>
             <a:fld id="{69B9443B-7D22-3248-B63C-65A84622FF78}" type="datetimeFigureOut">
               <a:rPr lang="en-US" smtClean="0"/>
-              <a:t>11/1/24</a:t>
+              <a:t>11/14/24</a:t>
             </a:fld>
             <a:endParaRPr lang="en-US"/>
           </a:p>
@@ -466,7 +466,7 @@
           <a:p>
             <a:fld id="{69B9443B-7D22-3248-B63C-65A84622FF78}" type="datetimeFigureOut">
               <a:rPr lang="en-US" smtClean="0"/>
-              <a:t>11/1/24</a:t>
+              <a:t>11/14/24</a:t>
             </a:fld>
             <a:endParaRPr lang="en-US"/>
           </a:p>
@@ -674,7 +674,7 @@
           <a:p>
             <a:fld id="{69B9443B-7D22-3248-B63C-65A84622FF78}" type="datetimeFigureOut">
               <a:rPr lang="en-US" smtClean="0"/>
-              <a:t>11/1/24</a:t>
+              <a:t>11/14/24</a:t>
             </a:fld>
             <a:endParaRPr lang="en-US"/>
           </a:p>
@@ -872,7 +872,7 @@
           <a:p>
             <a:fld id="{69B9443B-7D22-3248-B63C-65A84622FF78}" type="datetimeFigureOut">
               <a:rPr lang="en-US" smtClean="0"/>
-              <a:t>11/1/24</a:t>
+              <a:t>11/14/24</a:t>
             </a:fld>
             <a:endParaRPr lang="en-US"/>
           </a:p>
@@ -1147,7 +1147,7 @@
           <a:p>
             <a:fld id="{69B9443B-7D22-3248-B63C-65A84622FF78}" type="datetimeFigureOut">
               <a:rPr lang="en-US" smtClean="0"/>
-              <a:t>11/1/24</a:t>
+              <a:t>11/14/24</a:t>
             </a:fld>
             <a:endParaRPr lang="en-US"/>
           </a:p>
@@ -1412,7 +1412,7 @@
           <a:p>
             <a:fld id="{69B9443B-7D22-3248-B63C-65A84622FF78}" type="datetimeFigureOut">
               <a:rPr lang="en-US" smtClean="0"/>
-              <a:t>11/1/24</a:t>
+              <a:t>11/14/24</a:t>
             </a:fld>
             <a:endParaRPr lang="en-US"/>
           </a:p>
@@ -1824,7 +1824,7 @@
           <a:p>
             <a:fld id="{69B9443B-7D22-3248-B63C-65A84622FF78}" type="datetimeFigureOut">
               <a:rPr lang="en-US" smtClean="0"/>
-              <a:t>11/1/24</a:t>
+              <a:t>11/14/24</a:t>
             </a:fld>
             <a:endParaRPr lang="en-US"/>
           </a:p>
@@ -1965,7 +1965,7 @@
           <a:p>
             <a:fld id="{69B9443B-7D22-3248-B63C-65A84622FF78}" type="datetimeFigureOut">
               <a:rPr lang="en-US" smtClean="0"/>
-              <a:t>11/1/24</a:t>
+              <a:t>11/14/24</a:t>
             </a:fld>
             <a:endParaRPr lang="en-US"/>
           </a:p>
@@ -2078,7 +2078,7 @@
           <a:p>
             <a:fld id="{69B9443B-7D22-3248-B63C-65A84622FF78}" type="datetimeFigureOut">
               <a:rPr lang="en-US" smtClean="0"/>
-              <a:t>11/1/24</a:t>
+              <a:t>11/14/24</a:t>
             </a:fld>
             <a:endParaRPr lang="en-US"/>
           </a:p>
@@ -2389,7 +2389,7 @@
           <a:p>
             <a:fld id="{69B9443B-7D22-3248-B63C-65A84622FF78}" type="datetimeFigureOut">
               <a:rPr lang="en-US" smtClean="0"/>
-              <a:t>11/1/24</a:t>
+              <a:t>11/14/24</a:t>
             </a:fld>
             <a:endParaRPr lang="en-US"/>
           </a:p>
@@ -2677,7 +2677,7 @@
           <a:p>
             <a:fld id="{69B9443B-7D22-3248-B63C-65A84622FF78}" type="datetimeFigureOut">
               <a:rPr lang="en-US" smtClean="0"/>
-              <a:t>11/1/24</a:t>
+              <a:t>11/14/24</a:t>
             </a:fld>
             <a:endParaRPr lang="en-US"/>
           </a:p>
@@ -2918,7 +2918,7 @@
           <a:p>
             <a:fld id="{69B9443B-7D22-3248-B63C-65A84622FF78}" type="datetimeFigureOut">
               <a:rPr lang="en-US" smtClean="0"/>
-              <a:t>11/1/24</a:t>
+              <a:t>11/14/24</a:t>
             </a:fld>
             <a:endParaRPr lang="en-US"/>
           </a:p>

</xml_diff>